<commit_message>
Edit component slidech with container names
</commit_message>
<xml_diff>
--- a/Milestone1/milestone1_presentation.pptx
+++ b/Milestone1/milestone1_presentation.pptx
@@ -129,6 +129,11 @@
       </a:defRPr>
     </a:lvl9pPr>
   </p:defaultTextStyle>
+  <p:extLst>
+    <p:ext uri="{EFAFB233-063F-42B5-8137-9DF3F51BA10A}">
+      <p15:sldGuideLst xmlns:p15="http://schemas.microsoft.com/office/powerpoint/2012/main"/>
+    </p:ext>
+  </p:extLst>
 </p:presentation>
 </file>
 
@@ -10447,8 +10452,8 @@
         </p:nvSpPr>
         <p:spPr>
           <a:xfrm>
-            <a:off x="838080" y="365040"/>
-            <a:ext cx="10515240" cy="1325160"/>
+            <a:off x="527195" y="315879"/>
+            <a:ext cx="11137610" cy="1325160"/>
           </a:xfrm>
           <a:prstGeom prst="rect">
             <a:avLst/>
@@ -10471,15 +10476,33 @@
               <a:buNone/>
             </a:pPr>
             <a:r>
-              <a:rPr lang="en-US" sz="4400" b="0" strike="noStrike" spc="-1">
+              <a:rPr lang="en-US" sz="4400" b="0" strike="noStrike" spc="-1" dirty="0">
                 <a:solidFill>
                   <a:schemeClr val="dk1"/>
                 </a:solidFill>
                 <a:latin typeface="Aptos Display"/>
               </a:rPr>
-              <a:t>Architecture – L3 {container} components</a:t>
+              <a:t>Architecture – L3 </a:t>
             </a:r>
-            <a:endParaRPr lang="en-US" sz="4400" b="0" strike="noStrike" spc="-1">
+            <a:r>
+              <a:rPr lang="en-US" spc="-1" dirty="0">
+                <a:solidFill>
+                  <a:schemeClr val="dk1"/>
+                </a:solidFill>
+                <a:latin typeface="Aptos Display"/>
+              </a:rPr>
+              <a:t>s</a:t>
+            </a:r>
+            <a:r>
+              <a:rPr lang="en-US" sz="4400" b="0" strike="noStrike" spc="-1" dirty="0">
+                <a:solidFill>
+                  <a:schemeClr val="dk1"/>
+                </a:solidFill>
+                <a:latin typeface="Aptos Display"/>
+              </a:rPr>
+              <a:t>tatistics engine components</a:t>
+            </a:r>
+            <a:endParaRPr lang="en-US" sz="4400" b="0" strike="noStrike" spc="-1" dirty="0">
               <a:solidFill>
                 <a:schemeClr val="dk1"/>
               </a:solidFill>
@@ -11744,8 +11767,8 @@
         </p:nvSpPr>
         <p:spPr>
           <a:xfrm>
-            <a:off x="838080" y="365040"/>
-            <a:ext cx="10515240" cy="1325160"/>
+            <a:off x="363793" y="266718"/>
+            <a:ext cx="11720052" cy="1325160"/>
           </a:xfrm>
           <a:prstGeom prst="rect">
             <a:avLst/>
@@ -11768,15 +11791,33 @@
               <a:buNone/>
             </a:pPr>
             <a:r>
-              <a:rPr lang="en-US" sz="4400" b="0" strike="noStrike" spc="-1">
+              <a:rPr lang="en-US" sz="4400" b="0" strike="noStrike" spc="-1" dirty="0">
                 <a:solidFill>
                   <a:schemeClr val="dk1"/>
                 </a:solidFill>
                 <a:latin typeface="Aptos Display"/>
               </a:rPr>
-              <a:t>Architecture – L3 {container} components</a:t>
+              <a:t>Architecture – L3 enrollment </a:t>
             </a:r>
-            <a:endParaRPr lang="en-US" sz="4400" b="0" strike="noStrike" spc="-1">
+            <a:r>
+              <a:rPr lang="en-US" spc="-1" dirty="0">
+                <a:solidFill>
+                  <a:schemeClr val="dk1"/>
+                </a:solidFill>
+                <a:latin typeface="Aptos Display"/>
+              </a:rPr>
+              <a:t>manager </a:t>
+            </a:r>
+            <a:r>
+              <a:rPr lang="en-US" sz="4400" b="0" strike="noStrike" spc="-1" dirty="0">
+                <a:solidFill>
+                  <a:schemeClr val="dk1"/>
+                </a:solidFill>
+                <a:latin typeface="Aptos Display"/>
+              </a:rPr>
+              <a:t>components</a:t>
+            </a:r>
+            <a:endParaRPr lang="en-US" sz="4400" b="0" strike="noStrike" spc="-1" dirty="0">
               <a:solidFill>
                 <a:schemeClr val="dk1"/>
               </a:solidFill>

</xml_diff>